<commit_message>
check and fix animation in presentation
</commit_message>
<xml_diff>
--- a/clean-code2.pptx
+++ b/clean-code2.pptx
@@ -8765,244 +8765,6 @@
     <a:masterClrMapping/>
   </p:clrMapOvr>
   <p:transition xmlns:p14="http://schemas.microsoft.com/office/powerpoint/2010/main" spd="med" advClick="1"/>
-</p:sld>
-</file>
-
-<file path=ppt/slides/slide16.xml><?xml version="1.0" encoding="utf-8"?>
-<p:sld xmlns:a="http://schemas.openxmlformats.org/drawingml/2006/main" xmlns:r="http://schemas.openxmlformats.org/officeDocument/2006/relationships" xmlns:p="http://schemas.openxmlformats.org/presentationml/2006/main" showMasterSp="1" showMasterPhAnim="1">
-  <p:cSld>
-    <p:spTree>
-      <p:nvGrpSpPr>
-        <p:cNvPr id="1" name=""/>
-        <p:cNvGrpSpPr/>
-        <p:nvPr/>
-      </p:nvGrpSpPr>
-      <p:grpSpPr>
-        <a:xfrm>
-          <a:off x="0" y="0"/>
-          <a:ext cx="0" cy="0"/>
-          <a:chOff x="0" y="0"/>
-          <a:chExt cx="0" cy="0"/>
-        </a:xfrm>
-      </p:grpSpPr>
-      <p:sp>
-        <p:nvSpPr>
-          <p:cNvPr id="289" name="Объект 1"/>
-          <p:cNvSpPr txBox="1"/>
-          <p:nvPr>
-            <p:ph type="body" idx="1"/>
-          </p:nvPr>
-        </p:nvSpPr>
-        <p:spPr>
-          <a:xfrm>
-            <a:off x="1295399" y="1628778"/>
-            <a:ext cx="9601135" cy="4679953"/>
-          </a:xfrm>
-          <a:prstGeom prst="rect">
-            <a:avLst/>
-          </a:prstGeom>
-        </p:spPr>
-        <p:txBody>
-          <a:bodyPr/>
-          <a:lstStyle/>
-          <a:p>
-            <a:pPr marL="0" indent="0">
-              <a:buSzTx/>
-              <a:buNone/>
-              <a:defRPr>
-                <a:solidFill>
-                  <a:srgbClr val="0000FF"/>
-                </a:solidFill>
-                <a:latin typeface="Consolas"/>
-                <a:ea typeface="Consolas"/>
-                <a:cs typeface="Consolas"/>
-                <a:sym typeface="Consolas"/>
-              </a:defRPr>
-            </a:pPr>
-            <a:r>
-              <a:t>string</a:t>
-            </a:r>
-            <a:r>
-              <a:rPr>
-                <a:solidFill>
-                  <a:srgbClr val="000000"/>
-                </a:solidFill>
-              </a:rPr>
-              <a:t>[] SplitToFields(</a:t>
-            </a:r>
-            <a:r>
-              <a:t>string</a:t>
-            </a:r>
-            <a:r>
-              <a:rPr>
-                <a:solidFill>
-                  <a:srgbClr val="000000"/>
-                </a:solidFill>
-              </a:rPr>
-              <a:t> line)</a:t>
-            </a:r>
-            <a:endParaRPr>
-              <a:solidFill>
-                <a:srgbClr val="000000"/>
-              </a:solidFill>
-            </a:endParaRPr>
-          </a:p>
-          <a:p>
-            <a:pPr marL="0" indent="0">
-              <a:buSzTx/>
-              <a:buNone/>
-              <a:defRPr>
-                <a:latin typeface="Consolas"/>
-                <a:ea typeface="Consolas"/>
-                <a:cs typeface="Consolas"/>
-                <a:sym typeface="Consolas"/>
-              </a:defRPr>
-            </a:pPr>
-          </a:p>
-          <a:p>
-            <a:pPr marL="0" indent="0">
-              <a:buSzTx/>
-              <a:buNone/>
-              <a:defRPr>
-                <a:latin typeface="Consolas"/>
-                <a:ea typeface="Consolas"/>
-                <a:cs typeface="Consolas"/>
-                <a:sym typeface="Consolas"/>
-              </a:defRPr>
-            </a:pPr>
-            <a:r>
-              <a:t>Token: {</a:t>
-            </a:r>
-          </a:p>
-          <a:p>
-            <a:pPr marL="0" indent="0">
-              <a:buSzTx/>
-              <a:buNone/>
-              <a:defRPr>
-                <a:latin typeface="Consolas"/>
-                <a:ea typeface="Consolas"/>
-                <a:cs typeface="Consolas"/>
-                <a:sym typeface="Consolas"/>
-              </a:defRPr>
-            </a:pPr>
-            <a:r>
-              <a:t>	</a:t>
-            </a:r>
-            <a:r>
-              <a:rPr>
-                <a:solidFill>
-                  <a:srgbClr val="0000FF"/>
-                </a:solidFill>
-              </a:rPr>
-              <a:t>int </a:t>
-            </a:r>
-            <a:r>
-              <a:t>position,</a:t>
-            </a:r>
-          </a:p>
-          <a:p>
-            <a:pPr marL="0" indent="0">
-              <a:buSzTx/>
-              <a:buNone/>
-              <a:defRPr>
-                <a:latin typeface="Consolas"/>
-                <a:ea typeface="Consolas"/>
-                <a:cs typeface="Consolas"/>
-                <a:sym typeface="Consolas"/>
-              </a:defRPr>
-            </a:pPr>
-            <a:r>
-              <a:t>	</a:t>
-            </a:r>
-            <a:r>
-              <a:rPr>
-                <a:solidFill>
-                  <a:srgbClr val="0000FF"/>
-                </a:solidFill>
-              </a:rPr>
-              <a:t>int </a:t>
-            </a:r>
-            <a:r>
-              <a:t>length,</a:t>
-            </a:r>
-          </a:p>
-          <a:p>
-            <a:pPr marL="0" indent="0">
-              <a:buSzTx/>
-              <a:buNone/>
-              <a:defRPr>
-                <a:latin typeface="Consolas"/>
-                <a:ea typeface="Consolas"/>
-                <a:cs typeface="Consolas"/>
-                <a:sym typeface="Consolas"/>
-              </a:defRPr>
-            </a:pPr>
-            <a:r>
-              <a:t>	</a:t>
-            </a:r>
-            <a:r>
-              <a:rPr>
-                <a:solidFill>
-                  <a:srgbClr val="0000FF"/>
-                </a:solidFill>
-              </a:rPr>
-              <a:t>string </a:t>
-            </a:r>
-            <a:r>
-              <a:t>value,</a:t>
-            </a:r>
-          </a:p>
-          <a:p>
-            <a:pPr marL="0" indent="0">
-              <a:buSzTx/>
-              <a:buNone/>
-              <a:defRPr>
-                <a:latin typeface="Consolas"/>
-                <a:ea typeface="Consolas"/>
-                <a:cs typeface="Consolas"/>
-                <a:sym typeface="Consolas"/>
-              </a:defRPr>
-            </a:pPr>
-            <a:r>
-              <a:t>}</a:t>
-            </a:r>
-          </a:p>
-        </p:txBody>
-      </p:sp>
-      <p:sp>
-        <p:nvSpPr>
-          <p:cNvPr id="290" name="Заголовок 2"/>
-          <p:cNvSpPr txBox="1"/>
-          <p:nvPr>
-            <p:ph type="title"/>
-          </p:nvPr>
-        </p:nvSpPr>
-        <p:spPr>
-          <a:xfrm>
-            <a:off x="1295469" y="549276"/>
-            <a:ext cx="9601067" cy="792164"/>
-          </a:xfrm>
-          <a:prstGeom prst="rect">
-            <a:avLst/>
-          </a:prstGeom>
-        </p:spPr>
-        <p:txBody>
-          <a:bodyPr/>
-          <a:lstStyle/>
-          <a:p>
-            <a:pPr/>
-            <a:r>
-              <a:t>decomposition</a:t>
-            </a:r>
-          </a:p>
-        </p:txBody>
-      </p:sp>
-    </p:spTree>
-  </p:cSld>
-  <p:clrMapOvr>
-    <a:masterClrMapping/>
-  </p:clrMapOvr>
-  <p:transition xmlns:p14="http://schemas.microsoft.com/office/powerpoint/2010/main" spd="med" advClick="1"/>
   <p:timing>
     <p:tnLst>
       <p:par>
@@ -9036,7 +8798,7 @@
                                       <p:cBhvr>
                                         <p:cTn id="6" fill="hold"/>
                                         <p:tgtEl>
-                                          <p:spTgt spid="289">
+                                          <p:spTgt spid="284">
                                             <p:bg/>
                                           </p:spTgt>
                                         </p:tgtEl>
@@ -9064,7 +8826,7 @@
                                       <p:cBhvr>
                                         <p:cTn id="8" fill="hold"/>
                                         <p:tgtEl>
-                                          <p:spTgt spid="289">
+                                          <p:spTgt spid="284">
                                             <p:txEl>
                                               <p:pRg st="0" end="0"/>
                                             </p:txEl>
@@ -9084,14 +8846,23 @@
                             </p:childTnLst>
                           </p:cTn>
                         </p:par>
+                      </p:childTnLst>
+                    </p:cTn>
+                  </p:par>
+                  <p:par>
+                    <p:cTn id="9" fill="hold">
+                      <p:stCondLst>
+                        <p:cond delay="indefinite"/>
+                      </p:stCondLst>
+                      <p:childTnLst>
                         <p:par>
-                          <p:cTn id="9" fill="hold">
+                          <p:cTn id="10" fill="hold">
                             <p:stCondLst>
                               <p:cond delay="0"/>
                             </p:stCondLst>
                             <p:childTnLst>
                               <p:par>
-                                <p:cTn id="10" presetClass="entr" nodeType="afterEffect" presetSubtype="0" presetID="1" grpId="1" fill="hold">
+                                <p:cTn id="11" presetClass="entr" nodeType="clickEffect" presetSubtype="0" presetID="1" grpId="1" fill="hold">
                                   <p:stCondLst>
                                     <p:cond delay="0"/>
                                   </p:stCondLst>
@@ -9101,9 +8872,9 @@
                                   <p:childTnLst>
                                     <p:set>
                                       <p:cBhvr>
-                                        <p:cTn id="11" fill="hold"/>
+                                        <p:cTn id="12" fill="hold"/>
                                         <p:tgtEl>
-                                          <p:spTgt spid="289">
+                                          <p:spTgt spid="284">
                                             <p:txEl>
                                               <p:pRg st="1" end="1"/>
                                             </p:txEl>
@@ -9127,19 +8898,19 @@
                     </p:cTn>
                   </p:par>
                   <p:par>
-                    <p:cTn id="12" fill="hold">
+                    <p:cTn id="13" fill="hold">
                       <p:stCondLst>
                         <p:cond delay="indefinite"/>
                       </p:stCondLst>
                       <p:childTnLst>
                         <p:par>
-                          <p:cTn id="13" fill="hold">
+                          <p:cTn id="14" fill="hold">
                             <p:stCondLst>
                               <p:cond delay="0"/>
                             </p:stCondLst>
                             <p:childTnLst>
                               <p:par>
-                                <p:cTn id="14" presetClass="entr" nodeType="clickEffect" presetSubtype="0" presetID="1" grpId="1" fill="hold">
+                                <p:cTn id="15" presetClass="entr" nodeType="clickEffect" presetSubtype="0" presetID="1" grpId="1" fill="hold">
                                   <p:stCondLst>
                                     <p:cond delay="0"/>
                                   </p:stCondLst>
@@ -9149,203 +8920,11 @@
                                   <p:childTnLst>
                                     <p:set>
                                       <p:cBhvr>
-                                        <p:cTn id="15" fill="hold"/>
+                                        <p:cTn id="16" fill="hold"/>
                                         <p:tgtEl>
-                                          <p:spTgt spid="289">
+                                          <p:spTgt spid="284">
                                             <p:txEl>
                                               <p:pRg st="2" end="2"/>
-                                            </p:txEl>
-                                          </p:spTgt>
-                                        </p:tgtEl>
-                                        <p:attrNameLst>
-                                          <p:attrName>style.visibility</p:attrName>
-                                        </p:attrNameLst>
-                                      </p:cBhvr>
-                                      <p:to>
-                                        <p:strVal val="visible"/>
-                                      </p:to>
-                                    </p:set>
-                                  </p:childTnLst>
-                                </p:cTn>
-                              </p:par>
-                            </p:childTnLst>
-                          </p:cTn>
-                        </p:par>
-                      </p:childTnLst>
-                    </p:cTn>
-                  </p:par>
-                  <p:par>
-                    <p:cTn id="16" fill="hold">
-                      <p:stCondLst>
-                        <p:cond delay="indefinite"/>
-                      </p:stCondLst>
-                      <p:childTnLst>
-                        <p:par>
-                          <p:cTn id="17" fill="hold">
-                            <p:stCondLst>
-                              <p:cond delay="0"/>
-                            </p:stCondLst>
-                            <p:childTnLst>
-                              <p:par>
-                                <p:cTn id="18" presetClass="entr" nodeType="clickEffect" presetSubtype="0" presetID="1" grpId="1" fill="hold">
-                                  <p:stCondLst>
-                                    <p:cond delay="0"/>
-                                  </p:stCondLst>
-                                  <p:iterate type="el" backwards="0">
-                                    <p:tmAbs val="0"/>
-                                  </p:iterate>
-                                  <p:childTnLst>
-                                    <p:set>
-                                      <p:cBhvr>
-                                        <p:cTn id="19" fill="hold"/>
-                                        <p:tgtEl>
-                                          <p:spTgt spid="289">
-                                            <p:txEl>
-                                              <p:pRg st="3" end="3"/>
-                                            </p:txEl>
-                                          </p:spTgt>
-                                        </p:tgtEl>
-                                        <p:attrNameLst>
-                                          <p:attrName>style.visibility</p:attrName>
-                                        </p:attrNameLst>
-                                      </p:cBhvr>
-                                      <p:to>
-                                        <p:strVal val="visible"/>
-                                      </p:to>
-                                    </p:set>
-                                  </p:childTnLst>
-                                </p:cTn>
-                              </p:par>
-                            </p:childTnLst>
-                          </p:cTn>
-                        </p:par>
-                      </p:childTnLst>
-                    </p:cTn>
-                  </p:par>
-                  <p:par>
-                    <p:cTn id="20" fill="hold">
-                      <p:stCondLst>
-                        <p:cond delay="indefinite"/>
-                      </p:stCondLst>
-                      <p:childTnLst>
-                        <p:par>
-                          <p:cTn id="21" fill="hold">
-                            <p:stCondLst>
-                              <p:cond delay="0"/>
-                            </p:stCondLst>
-                            <p:childTnLst>
-                              <p:par>
-                                <p:cTn id="22" presetClass="entr" nodeType="clickEffect" presetSubtype="0" presetID="1" grpId="1" fill="hold">
-                                  <p:stCondLst>
-                                    <p:cond delay="0"/>
-                                  </p:stCondLst>
-                                  <p:iterate type="el" backwards="0">
-                                    <p:tmAbs val="0"/>
-                                  </p:iterate>
-                                  <p:childTnLst>
-                                    <p:set>
-                                      <p:cBhvr>
-                                        <p:cTn id="23" fill="hold"/>
-                                        <p:tgtEl>
-                                          <p:spTgt spid="289">
-                                            <p:txEl>
-                                              <p:pRg st="4" end="4"/>
-                                            </p:txEl>
-                                          </p:spTgt>
-                                        </p:tgtEl>
-                                        <p:attrNameLst>
-                                          <p:attrName>style.visibility</p:attrName>
-                                        </p:attrNameLst>
-                                      </p:cBhvr>
-                                      <p:to>
-                                        <p:strVal val="visible"/>
-                                      </p:to>
-                                    </p:set>
-                                  </p:childTnLst>
-                                </p:cTn>
-                              </p:par>
-                            </p:childTnLst>
-                          </p:cTn>
-                        </p:par>
-                      </p:childTnLst>
-                    </p:cTn>
-                  </p:par>
-                  <p:par>
-                    <p:cTn id="24" fill="hold">
-                      <p:stCondLst>
-                        <p:cond delay="indefinite"/>
-                      </p:stCondLst>
-                      <p:childTnLst>
-                        <p:par>
-                          <p:cTn id="25" fill="hold">
-                            <p:stCondLst>
-                              <p:cond delay="0"/>
-                            </p:stCondLst>
-                            <p:childTnLst>
-                              <p:par>
-                                <p:cTn id="26" presetClass="entr" nodeType="clickEffect" presetSubtype="0" presetID="1" grpId="1" fill="hold">
-                                  <p:stCondLst>
-                                    <p:cond delay="0"/>
-                                  </p:stCondLst>
-                                  <p:iterate type="el" backwards="0">
-                                    <p:tmAbs val="0"/>
-                                  </p:iterate>
-                                  <p:childTnLst>
-                                    <p:set>
-                                      <p:cBhvr>
-                                        <p:cTn id="27" fill="hold"/>
-                                        <p:tgtEl>
-                                          <p:spTgt spid="289">
-                                            <p:txEl>
-                                              <p:pRg st="5" end="5"/>
-                                            </p:txEl>
-                                          </p:spTgt>
-                                        </p:tgtEl>
-                                        <p:attrNameLst>
-                                          <p:attrName>style.visibility</p:attrName>
-                                        </p:attrNameLst>
-                                      </p:cBhvr>
-                                      <p:to>
-                                        <p:strVal val="visible"/>
-                                      </p:to>
-                                    </p:set>
-                                  </p:childTnLst>
-                                </p:cTn>
-                              </p:par>
-                            </p:childTnLst>
-                          </p:cTn>
-                        </p:par>
-                      </p:childTnLst>
-                    </p:cTn>
-                  </p:par>
-                  <p:par>
-                    <p:cTn id="28" fill="hold">
-                      <p:stCondLst>
-                        <p:cond delay="indefinite"/>
-                      </p:stCondLst>
-                      <p:childTnLst>
-                        <p:par>
-                          <p:cTn id="29" fill="hold">
-                            <p:stCondLst>
-                              <p:cond delay="0"/>
-                            </p:stCondLst>
-                            <p:childTnLst>
-                              <p:par>
-                                <p:cTn id="30" presetClass="entr" nodeType="clickEffect" presetSubtype="0" presetID="1" grpId="1" fill="hold">
-                                  <p:stCondLst>
-                                    <p:cond delay="0"/>
-                                  </p:stCondLst>
-                                  <p:iterate type="el" backwards="0">
-                                    <p:tmAbs val="0"/>
-                                  </p:iterate>
-                                  <p:childTnLst>
-                                    <p:set>
-                                      <p:cBhvr>
-                                        <p:cTn id="31" fill="hold"/>
-                                        <p:tgtEl>
-                                          <p:spTgt spid="289">
-                                            <p:txEl>
-                                              <p:pRg st="6" end="6"/>
                                             </p:txEl>
                                           </p:spTgt>
                                         </p:tgtEl>
@@ -9388,9 +8967,247 @@
       </p:par>
     </p:tnLst>
     <p:bldLst>
-      <p:bldP build="p" bldLvl="1" animBg="1" rev="0" advAuto="0" spid="289" grpId="1"/>
+      <p:bldP build="p" bldLvl="5" animBg="1" rev="0" advAuto="0" spid="284" grpId="1"/>
     </p:bldLst>
   </p:timing>
+</p:sld>
+</file>
+
+<file path=ppt/slides/slide16.xml><?xml version="1.0" encoding="utf-8"?>
+<p:sld xmlns:a="http://schemas.openxmlformats.org/drawingml/2006/main" xmlns:r="http://schemas.openxmlformats.org/officeDocument/2006/relationships" xmlns:p="http://schemas.openxmlformats.org/presentationml/2006/main" showMasterSp="1" showMasterPhAnim="1">
+  <p:cSld>
+    <p:spTree>
+      <p:nvGrpSpPr>
+        <p:cNvPr id="1" name=""/>
+        <p:cNvGrpSpPr/>
+        <p:nvPr/>
+      </p:nvGrpSpPr>
+      <p:grpSpPr>
+        <a:xfrm>
+          <a:off x="0" y="0"/>
+          <a:ext cx="0" cy="0"/>
+          <a:chOff x="0" y="0"/>
+          <a:chExt cx="0" cy="0"/>
+        </a:xfrm>
+      </p:grpSpPr>
+      <p:sp>
+        <p:nvSpPr>
+          <p:cNvPr id="289" name="Объект 1"/>
+          <p:cNvSpPr txBox="1"/>
+          <p:nvPr>
+            <p:ph type="body" idx="1"/>
+          </p:nvPr>
+        </p:nvSpPr>
+        <p:spPr>
+          <a:xfrm>
+            <a:off x="1295399" y="1628778"/>
+            <a:ext cx="9601135" cy="4679953"/>
+          </a:xfrm>
+          <a:prstGeom prst="rect">
+            <a:avLst/>
+          </a:prstGeom>
+        </p:spPr>
+        <p:txBody>
+          <a:bodyPr/>
+          <a:lstStyle/>
+          <a:p>
+            <a:pPr marL="0" indent="0">
+              <a:buSzTx/>
+              <a:buNone/>
+              <a:defRPr>
+                <a:solidFill>
+                  <a:srgbClr val="0000FF"/>
+                </a:solidFill>
+                <a:latin typeface="Consolas"/>
+                <a:ea typeface="Consolas"/>
+                <a:cs typeface="Consolas"/>
+                <a:sym typeface="Consolas"/>
+              </a:defRPr>
+            </a:pPr>
+            <a:r>
+              <a:t>string</a:t>
+            </a:r>
+            <a:r>
+              <a:rPr>
+                <a:solidFill>
+                  <a:srgbClr val="000000"/>
+                </a:solidFill>
+              </a:rPr>
+              <a:t>[] SplitToFields(</a:t>
+            </a:r>
+            <a:r>
+              <a:t>string</a:t>
+            </a:r>
+            <a:r>
+              <a:rPr>
+                <a:solidFill>
+                  <a:srgbClr val="000000"/>
+                </a:solidFill>
+              </a:rPr>
+              <a:t> line)</a:t>
+            </a:r>
+            <a:endParaRPr>
+              <a:solidFill>
+                <a:srgbClr val="000000"/>
+              </a:solidFill>
+            </a:endParaRPr>
+          </a:p>
+          <a:p>
+            <a:pPr marL="0" indent="0">
+              <a:buSzTx/>
+              <a:buNone/>
+              <a:defRPr>
+                <a:latin typeface="Consolas"/>
+                <a:ea typeface="Consolas"/>
+                <a:cs typeface="Consolas"/>
+                <a:sym typeface="Consolas"/>
+              </a:defRPr>
+            </a:pPr>
+          </a:p>
+          <a:p>
+            <a:pPr marL="0" indent="0">
+              <a:buSzTx/>
+              <a:buNone/>
+              <a:defRPr>
+                <a:latin typeface="Consolas"/>
+                <a:ea typeface="Consolas"/>
+                <a:cs typeface="Consolas"/>
+                <a:sym typeface="Consolas"/>
+              </a:defRPr>
+            </a:pPr>
+            <a:r>
+              <a:t>Token: {</a:t>
+            </a:r>
+          </a:p>
+          <a:p>
+            <a:pPr marL="0" indent="0">
+              <a:buSzTx/>
+              <a:buNone/>
+              <a:defRPr>
+                <a:latin typeface="Consolas"/>
+                <a:ea typeface="Consolas"/>
+                <a:cs typeface="Consolas"/>
+                <a:sym typeface="Consolas"/>
+              </a:defRPr>
+            </a:pPr>
+            <a:r>
+              <a:t>	</a:t>
+            </a:r>
+            <a:r>
+              <a:rPr>
+                <a:solidFill>
+                  <a:srgbClr val="0000FF"/>
+                </a:solidFill>
+              </a:rPr>
+              <a:t>int </a:t>
+            </a:r>
+            <a:r>
+              <a:t>position,</a:t>
+            </a:r>
+          </a:p>
+          <a:p>
+            <a:pPr marL="0" indent="0">
+              <a:buSzTx/>
+              <a:buNone/>
+              <a:defRPr>
+                <a:latin typeface="Consolas"/>
+                <a:ea typeface="Consolas"/>
+                <a:cs typeface="Consolas"/>
+                <a:sym typeface="Consolas"/>
+              </a:defRPr>
+            </a:pPr>
+            <a:r>
+              <a:t>	</a:t>
+            </a:r>
+            <a:r>
+              <a:rPr>
+                <a:solidFill>
+                  <a:srgbClr val="0000FF"/>
+                </a:solidFill>
+              </a:rPr>
+              <a:t>int </a:t>
+            </a:r>
+            <a:r>
+              <a:t>length,</a:t>
+            </a:r>
+          </a:p>
+          <a:p>
+            <a:pPr marL="0" indent="0">
+              <a:buSzTx/>
+              <a:buNone/>
+              <a:defRPr>
+                <a:latin typeface="Consolas"/>
+                <a:ea typeface="Consolas"/>
+                <a:cs typeface="Consolas"/>
+                <a:sym typeface="Consolas"/>
+              </a:defRPr>
+            </a:pPr>
+            <a:r>
+              <a:t>	</a:t>
+            </a:r>
+            <a:r>
+              <a:rPr>
+                <a:solidFill>
+                  <a:srgbClr val="0000FF"/>
+                </a:solidFill>
+              </a:rPr>
+              <a:t>string </a:t>
+            </a:r>
+            <a:r>
+              <a:t>value,</a:t>
+            </a:r>
+          </a:p>
+          <a:p>
+            <a:pPr marL="0" indent="0">
+              <a:buSzTx/>
+              <a:buNone/>
+              <a:defRPr>
+                <a:latin typeface="Consolas"/>
+                <a:ea typeface="Consolas"/>
+                <a:cs typeface="Consolas"/>
+                <a:sym typeface="Consolas"/>
+              </a:defRPr>
+            </a:pPr>
+            <a:r>
+              <a:t>}</a:t>
+            </a:r>
+          </a:p>
+        </p:txBody>
+      </p:sp>
+      <p:sp>
+        <p:nvSpPr>
+          <p:cNvPr id="290" name="Заголовок 2"/>
+          <p:cNvSpPr txBox="1"/>
+          <p:nvPr>
+            <p:ph type="title"/>
+          </p:nvPr>
+        </p:nvSpPr>
+        <p:spPr>
+          <a:xfrm>
+            <a:off x="1295469" y="549276"/>
+            <a:ext cx="9601067" cy="792164"/>
+          </a:xfrm>
+          <a:prstGeom prst="rect">
+            <a:avLst/>
+          </a:prstGeom>
+        </p:spPr>
+        <p:txBody>
+          <a:bodyPr/>
+          <a:lstStyle/>
+          <a:p>
+            <a:pPr/>
+            <a:r>
+              <a:t>decomposition</a:t>
+            </a:r>
+          </a:p>
+        </p:txBody>
+      </p:sp>
+    </p:spTree>
+  </p:cSld>
+  <p:clrMapOvr>
+    <a:masterClrMapping/>
+  </p:clrMapOvr>
+  <p:transition xmlns:p14="http://schemas.microsoft.com/office/powerpoint/2010/main" spd="med" advClick="1"/>
 </p:sld>
 </file>
 
@@ -9484,83 +9301,6 @@
     <a:masterClrMapping/>
   </p:clrMapOvr>
   <p:transition xmlns:p14="http://schemas.microsoft.com/office/powerpoint/2010/main" spd="med" advClick="1"/>
-  <p:timing>
-    <p:tnLst>
-      <p:par>
-        <p:cTn id="1" nodeType="tmRoot" restart="never" dur="indefinite" fill="hold">
-          <p:childTnLst>
-            <p:seq concurrent="1" prevAc="none" nextAc="seek">
-              <p:cTn id="2" nodeType="mainSeq" dur="indefinite" fill="hold">
-                <p:childTnLst>
-                  <p:par>
-                    <p:cTn id="3" fill="hold">
-                      <p:stCondLst>
-                        <p:cond delay="indefinite"/>
-                      </p:stCondLst>
-                      <p:childTnLst>
-                        <p:par>
-                          <p:cTn id="4" fill="hold">
-                            <p:stCondLst>
-                              <p:cond delay="0"/>
-                            </p:stCondLst>
-                            <p:childTnLst>
-                              <p:par>
-                                <p:cTn id="5" presetClass="entr" nodeType="clickEffect" presetSubtype="0" presetID="1" grpId="1" fill="hold">
-                                  <p:stCondLst>
-                                    <p:cond delay="0"/>
-                                  </p:stCondLst>
-                                  <p:iterate type="el" backwards="0">
-                                    <p:tmAbs val="0"/>
-                                  </p:iterate>
-                                  <p:childTnLst>
-                                    <p:set>
-                                      <p:cBhvr>
-                                        <p:cTn id="6" fill="hold"/>
-                                        <p:tgtEl>
-                                          <p:spTgt spid="294"/>
-                                        </p:tgtEl>
-                                        <p:attrNameLst>
-                                          <p:attrName>style.visibility</p:attrName>
-                                        </p:attrNameLst>
-                                      </p:cBhvr>
-                                      <p:to>
-                                        <p:strVal val="visible"/>
-                                      </p:to>
-                                    </p:set>
-                                  </p:childTnLst>
-                                </p:cTn>
-                              </p:par>
-                            </p:childTnLst>
-                          </p:cTn>
-                        </p:par>
-                      </p:childTnLst>
-                    </p:cTn>
-                  </p:par>
-                </p:childTnLst>
-              </p:cTn>
-              <p:prevCondLst>
-                <p:cond evt="onPrev">
-                  <p:tgtEl>
-                    <p:sldTgt/>
-                  </p:tgtEl>
-                </p:cond>
-              </p:prevCondLst>
-              <p:nextCondLst>
-                <p:cond evt="onNext">
-                  <p:tgtEl>
-                    <p:sldTgt/>
-                  </p:tgtEl>
-                </p:cond>
-              </p:nextCondLst>
-            </p:seq>
-          </p:childTnLst>
-        </p:cTn>
-      </p:par>
-    </p:tnLst>
-    <p:bldLst>
-      <p:bldP build="whole" bldLvl="1" animBg="1" rev="0" advAuto="0" spid="294" grpId="1"/>
-    </p:bldLst>
-  </p:timing>
 </p:sld>
 </file>
 
@@ -9889,241 +9629,6 @@
     <a:masterClrMapping/>
   </p:clrMapOvr>
   <p:transition xmlns:p14="http://schemas.microsoft.com/office/powerpoint/2010/main" spd="med" advClick="1"/>
-  <p:timing>
-    <p:tnLst>
-      <p:par>
-        <p:cTn id="1" nodeType="tmRoot" restart="never" dur="indefinite" fill="hold">
-          <p:childTnLst>
-            <p:seq concurrent="1" prevAc="none" nextAc="seek">
-              <p:cTn id="2" nodeType="mainSeq" dur="indefinite" fill="hold">
-                <p:childTnLst>
-                  <p:par>
-                    <p:cTn id="3" fill="hold">
-                      <p:stCondLst>
-                        <p:cond delay="indefinite"/>
-                      </p:stCondLst>
-                      <p:childTnLst>
-                        <p:par>
-                          <p:cTn id="4" fill="hold">
-                            <p:stCondLst>
-                              <p:cond delay="0"/>
-                            </p:stCondLst>
-                            <p:childTnLst>
-                              <p:par>
-                                <p:cTn id="5" presetClass="entr" nodeType="clickEffect" presetSubtype="0" presetID="1" grpId="1" fill="hold">
-                                  <p:stCondLst>
-                                    <p:cond delay="0"/>
-                                  </p:stCondLst>
-                                  <p:iterate type="el" backwards="0">
-                                    <p:tmAbs val="0"/>
-                                  </p:iterate>
-                                  <p:childTnLst>
-                                    <p:set>
-                                      <p:cBhvr>
-                                        <p:cTn id="6" fill="hold"/>
-                                        <p:tgtEl>
-                                          <p:spTgt spid="297">
-                                            <p:bg/>
-                                          </p:spTgt>
-                                        </p:tgtEl>
-                                        <p:attrNameLst>
-                                          <p:attrName>style.visibility</p:attrName>
-                                        </p:attrNameLst>
-                                      </p:cBhvr>
-                                      <p:to>
-                                        <p:strVal val="visible"/>
-                                      </p:to>
-                                    </p:set>
-                                  </p:childTnLst>
-                                </p:cTn>
-                              </p:par>
-                              <p:par>
-                                <p:cTn id="7" presetClass="entr" nodeType="withEffect" presetSubtype="0" presetID="1" grpId="1" fill="hold">
-                                  <p:stCondLst>
-                                    <p:cond delay="0"/>
-                                  </p:stCondLst>
-                                  <p:iterate type="el" backwards="0">
-                                    <p:tmAbs val="0"/>
-                                  </p:iterate>
-                                  <p:childTnLst>
-                                    <p:set>
-                                      <p:cBhvr>
-                                        <p:cTn id="8" fill="hold"/>
-                                        <p:tgtEl>
-                                          <p:spTgt spid="297">
-                                            <p:txEl>
-                                              <p:pRg st="0" end="0"/>
-                                            </p:txEl>
-                                          </p:spTgt>
-                                        </p:tgtEl>
-                                        <p:attrNameLst>
-                                          <p:attrName>style.visibility</p:attrName>
-                                        </p:attrNameLst>
-                                      </p:cBhvr>
-                                      <p:to>
-                                        <p:strVal val="visible"/>
-                                      </p:to>
-                                    </p:set>
-                                  </p:childTnLst>
-                                </p:cTn>
-                              </p:par>
-                            </p:childTnLst>
-                          </p:cTn>
-                        </p:par>
-                      </p:childTnLst>
-                    </p:cTn>
-                  </p:par>
-                  <p:par>
-                    <p:cTn id="9" fill="hold">
-                      <p:stCondLst>
-                        <p:cond delay="indefinite"/>
-                      </p:stCondLst>
-                      <p:childTnLst>
-                        <p:par>
-                          <p:cTn id="10" fill="hold">
-                            <p:stCondLst>
-                              <p:cond delay="0"/>
-                            </p:stCondLst>
-                            <p:childTnLst>
-                              <p:par>
-                                <p:cTn id="11" presetClass="entr" nodeType="clickEffect" presetSubtype="0" presetID="1" grpId="1" fill="hold">
-                                  <p:stCondLst>
-                                    <p:cond delay="0"/>
-                                  </p:stCondLst>
-                                  <p:iterate type="el" backwards="0">
-                                    <p:tmAbs val="0"/>
-                                  </p:iterate>
-                                  <p:childTnLst>
-                                    <p:set>
-                                      <p:cBhvr>
-                                        <p:cTn id="12" fill="hold"/>
-                                        <p:tgtEl>
-                                          <p:spTgt spid="297">
-                                            <p:txEl>
-                                              <p:pRg st="1" end="1"/>
-                                            </p:txEl>
-                                          </p:spTgt>
-                                        </p:tgtEl>
-                                        <p:attrNameLst>
-                                          <p:attrName>style.visibility</p:attrName>
-                                        </p:attrNameLst>
-                                      </p:cBhvr>
-                                      <p:to>
-                                        <p:strVal val="visible"/>
-                                      </p:to>
-                                    </p:set>
-                                  </p:childTnLst>
-                                </p:cTn>
-                              </p:par>
-                            </p:childTnLst>
-                          </p:cTn>
-                        </p:par>
-                      </p:childTnLst>
-                    </p:cTn>
-                  </p:par>
-                  <p:par>
-                    <p:cTn id="13" fill="hold">
-                      <p:stCondLst>
-                        <p:cond delay="indefinite"/>
-                      </p:stCondLst>
-                      <p:childTnLst>
-                        <p:par>
-                          <p:cTn id="14" fill="hold">
-                            <p:stCondLst>
-                              <p:cond delay="0"/>
-                            </p:stCondLst>
-                            <p:childTnLst>
-                              <p:par>
-                                <p:cTn id="15" presetClass="entr" nodeType="clickEffect" presetSubtype="0" presetID="1" grpId="1" fill="hold">
-                                  <p:stCondLst>
-                                    <p:cond delay="0"/>
-                                  </p:stCondLst>
-                                  <p:iterate type="el" backwards="0">
-                                    <p:tmAbs val="0"/>
-                                  </p:iterate>
-                                  <p:childTnLst>
-                                    <p:set>
-                                      <p:cBhvr>
-                                        <p:cTn id="16" fill="hold"/>
-                                        <p:tgtEl>
-                                          <p:spTgt spid="297">
-                                            <p:txEl>
-                                              <p:pRg st="2" end="2"/>
-                                            </p:txEl>
-                                          </p:spTgt>
-                                        </p:tgtEl>
-                                        <p:attrNameLst>
-                                          <p:attrName>style.visibility</p:attrName>
-                                        </p:attrNameLst>
-                                      </p:cBhvr>
-                                      <p:to>
-                                        <p:strVal val="visible"/>
-                                      </p:to>
-                                    </p:set>
-                                  </p:childTnLst>
-                                </p:cTn>
-                              </p:par>
-                              <p:par>
-                                <p:cTn id="17" presetClass="entr" nodeType="withEffect" presetSubtype="0" presetID="1" grpId="1" fill="hold">
-                                  <p:stCondLst>
-                                    <p:cond delay="0"/>
-                                  </p:stCondLst>
-                                  <p:iterate type="el" backwards="0">
-                                    <p:tmAbs val="0"/>
-                                  </p:iterate>
-                                  <p:childTnLst>
-                                    <p:set>
-                                      <p:cBhvr>
-                                        <p:cTn id="18" fill="hold"/>
-                                        <p:tgtEl>
-                                          <p:spTgt spid="297">
-                                            <p:txEl>
-                                              <p:pRg st="3" end="3"/>
-                                            </p:txEl>
-                                          </p:spTgt>
-                                        </p:tgtEl>
-                                        <p:attrNameLst>
-                                          <p:attrName>style.visibility</p:attrName>
-                                        </p:attrNameLst>
-                                      </p:cBhvr>
-                                      <p:to>
-                                        <p:strVal val="visible"/>
-                                      </p:to>
-                                    </p:set>
-                                  </p:childTnLst>
-                                </p:cTn>
-                              </p:par>
-                            </p:childTnLst>
-                          </p:cTn>
-                        </p:par>
-                      </p:childTnLst>
-                    </p:cTn>
-                  </p:par>
-                </p:childTnLst>
-              </p:cTn>
-              <p:prevCondLst>
-                <p:cond evt="onPrev">
-                  <p:tgtEl>
-                    <p:sldTgt/>
-                  </p:tgtEl>
-                </p:cond>
-              </p:prevCondLst>
-              <p:nextCondLst>
-                <p:cond evt="onNext">
-                  <p:tgtEl>
-                    <p:sldTgt/>
-                  </p:tgtEl>
-                </p:cond>
-              </p:nextCondLst>
-            </p:seq>
-          </p:childTnLst>
-        </p:cTn>
-      </p:par>
-    </p:tnLst>
-    <p:bldLst>
-      <p:bldP build="p" bldLvl="1" animBg="1" rev="0" advAuto="0" spid="297" grpId="1"/>
-    </p:bldLst>
-  </p:timing>
 </p:sld>
 </file>
 
@@ -10673,9 +10178,9 @@
       </p:par>
     </p:tnLst>
     <p:bldLst>
-      <p:bldP build="whole" bldLvl="1" animBg="1" rev="0" advAuto="0" spid="231" grpId="3"/>
       <p:bldP build="p" bldLvl="1" animBg="1" rev="0" advAuto="0" spid="228" grpId="1"/>
       <p:bldP build="whole" bldLvl="1" animBg="1" rev="0" advAuto="0" spid="230" grpId="2"/>
+      <p:bldP build="whole" bldLvl="1" animBg="1" rev="0" advAuto="0" spid="231" grpId="3"/>
     </p:bldLst>
   </p:timing>
 </p:sld>
@@ -10823,7 +10328,7 @@
                   <a:srgbClr val="000000"/>
                 </a:solidFill>
               </a:rPr>
-              <a:t>ReadUntil(Func&lt;</a:t>
+              <a:t>ReadWhile(</a:t>
             </a:r>
             <a:r>
               <a:t>char</a:t>
@@ -10834,103 +10339,7 @@
                   <a:srgbClr val="000000"/>
                 </a:solidFill>
               </a:rPr>
-              <a:t>, </a:t>
-            </a:r>
-            <a:r>
-              <a:t>bool</a:t>
-            </a:r>
-            <a:r>
-              <a:rPr>
-                <a:solidFill>
-                  <a:srgbClr val="000000"/>
-                </a:solidFill>
-              </a:rPr>
-              <a:t>&gt; isStopChar);</a:t>
-            </a:r>
-            <a:br>
-              <a:rPr>
-                <a:solidFill>
-                  <a:srgbClr val="000000"/>
-                </a:solidFill>
-              </a:rPr>
-            </a:br>
-            <a:r>
-              <a:t>    </a:t>
-            </a:r>
-            <a:r>
-              <a:rPr>
-                <a:solidFill>
-                  <a:srgbClr val="00806C"/>
-                </a:solidFill>
-              </a:rPr>
-              <a:t>Token </a:t>
-            </a:r>
-            <a:r>
-              <a:rPr>
-                <a:solidFill>
-                  <a:srgbClr val="000000"/>
-                </a:solidFill>
-              </a:rPr>
-              <a:t>ReadWhile(</a:t>
-            </a:r>
-            <a:r>
-              <a:t>char</a:t>
-            </a:r>
-            <a:r>
-              <a:rPr>
-                <a:solidFill>
-                  <a:srgbClr val="000000"/>
-                </a:solidFill>
-              </a:rPr>
               <a:t>[] acceptableChars);</a:t>
-            </a:r>
-            <a:br>
-              <a:rPr>
-                <a:solidFill>
-                  <a:srgbClr val="000000"/>
-                </a:solidFill>
-              </a:rPr>
-            </a:br>
-            <a:r>
-              <a:t>    </a:t>
-            </a:r>
-            <a:r>
-              <a:rPr>
-                <a:solidFill>
-                  <a:srgbClr val="00806C"/>
-                </a:solidFill>
-              </a:rPr>
-              <a:t>Token </a:t>
-            </a:r>
-            <a:r>
-              <a:rPr>
-                <a:solidFill>
-                  <a:srgbClr val="000000"/>
-                </a:solidFill>
-              </a:rPr>
-              <a:t>ReadWhile(Func&lt;</a:t>
-            </a:r>
-            <a:r>
-              <a:t>char</a:t>
-            </a:r>
-            <a:r>
-              <a:rPr>
-                <a:solidFill>
-                  <a:srgbClr val="000000"/>
-                </a:solidFill>
-              </a:rPr>
-              <a:t>, </a:t>
-            </a:r>
-            <a:r>
-              <a:t>bool</a:t>
-            </a:r>
-            <a:r>
-              <a:rPr>
-                <a:solidFill>
-                  <a:srgbClr val="000000"/>
-                </a:solidFill>
-              </a:rPr>
-              <a:t>&gt; accept);</a:t>
             </a:r>
             <a:br>
               <a:rPr>
@@ -11072,135 +10481,7 @@
                                       <p:cBhvr>
                                         <p:cTn id="6" fill="hold"/>
                                         <p:tgtEl>
-                                          <p:spTgt spid="302">
-                                            <p:bg/>
-                                          </p:spTgt>
-                                        </p:tgtEl>
-                                        <p:attrNameLst>
-                                          <p:attrName>style.visibility</p:attrName>
-                                        </p:attrNameLst>
-                                      </p:cBhvr>
-                                      <p:to>
-                                        <p:strVal val="visible"/>
-                                      </p:to>
-                                    </p:set>
-                                  </p:childTnLst>
-                                </p:cTn>
-                              </p:par>
-                              <p:par>
-                                <p:cTn id="7" presetClass="entr" nodeType="withEffect" presetSubtype="0" presetID="1" grpId="1" fill="hold">
-                                  <p:stCondLst>
-                                    <p:cond delay="0"/>
-                                  </p:stCondLst>
-                                  <p:iterate type="el" backwards="0">
-                                    <p:tmAbs val="0"/>
-                                  </p:iterate>
-                                  <p:childTnLst>
-                                    <p:set>
-                                      <p:cBhvr>
-                                        <p:cTn id="8" fill="hold"/>
-                                        <p:tgtEl>
-                                          <p:spTgt spid="302">
-                                            <p:txEl>
-                                              <p:pRg st="0" end="0"/>
-                                            </p:txEl>
-                                          </p:spTgt>
-                                        </p:tgtEl>
-                                        <p:attrNameLst>
-                                          <p:attrName>style.visibility</p:attrName>
-                                        </p:attrNameLst>
-                                      </p:cBhvr>
-                                      <p:to>
-                                        <p:strVal val="visible"/>
-                                      </p:to>
-                                    </p:set>
-                                  </p:childTnLst>
-                                </p:cTn>
-                              </p:par>
-                            </p:childTnLst>
-                          </p:cTn>
-                        </p:par>
-                      </p:childTnLst>
-                    </p:cTn>
-                  </p:par>
-                  <p:par>
-                    <p:cTn id="9" fill="hold">
-                      <p:stCondLst>
-                        <p:cond delay="indefinite"/>
-                      </p:stCondLst>
-                      <p:childTnLst>
-                        <p:par>
-                          <p:cTn id="10" fill="hold">
-                            <p:stCondLst>
-                              <p:cond delay="0"/>
-                            </p:stCondLst>
-                            <p:childTnLst>
-                              <p:par>
-                                <p:cTn id="11" presetClass="entr" nodeType="clickEffect" presetSubtype="0" presetID="1" grpId="1" fill="hold">
-                                  <p:stCondLst>
-                                    <p:cond delay="0"/>
-                                  </p:stCondLst>
-                                  <p:iterate type="el" backwards="0">
-                                    <p:tmAbs val="0"/>
-                                  </p:iterate>
-                                  <p:childTnLst>
-                                    <p:set>
-                                      <p:cBhvr>
-                                        <p:cTn id="12" fill="hold"/>
-                                        <p:tgtEl>
-                                          <p:spTgt spid="302">
-                                            <p:txEl>
-                                              <p:pRg st="1" end="1"/>
-                                            </p:txEl>
-                                          </p:spTgt>
-                                        </p:tgtEl>
-                                        <p:attrNameLst>
-                                          <p:attrName>style.visibility</p:attrName>
-                                        </p:attrNameLst>
-                                      </p:cBhvr>
-                                      <p:to>
-                                        <p:strVal val="visible"/>
-                                      </p:to>
-                                    </p:set>
-                                  </p:childTnLst>
-                                </p:cTn>
-                              </p:par>
-                            </p:childTnLst>
-                          </p:cTn>
-                        </p:par>
-                      </p:childTnLst>
-                    </p:cTn>
-                  </p:par>
-                  <p:par>
-                    <p:cTn id="13" fill="hold">
-                      <p:stCondLst>
-                        <p:cond delay="indefinite"/>
-                      </p:stCondLst>
-                      <p:childTnLst>
-                        <p:par>
-                          <p:cTn id="14" fill="hold">
-                            <p:stCondLst>
-                              <p:cond delay="0"/>
-                            </p:stCondLst>
-                            <p:childTnLst>
-                              <p:par>
-                                <p:cTn id="15" presetClass="entr" nodeType="clickEffect" presetSubtype="0" presetID="1" grpId="1" fill="hold">
-                                  <p:stCondLst>
-                                    <p:cond delay="0"/>
-                                  </p:stCondLst>
-                                  <p:iterate type="el" backwards="0">
-                                    <p:tmAbs val="0"/>
-                                  </p:iterate>
-                                  <p:childTnLst>
-                                    <p:set>
-                                      <p:cBhvr>
-                                        <p:cTn id="16" fill="hold"/>
-                                        <p:tgtEl>
-                                          <p:spTgt spid="302">
-                                            <p:txEl>
-                                              <p:pRg st="2" end="2"/>
-                                            </p:txEl>
-                                          </p:spTgt>
+                                          <p:spTgt spid="302"/>
                                         </p:tgtEl>
                                         <p:attrNameLst>
                                           <p:attrName>style.visibility</p:attrName>
@@ -11241,7 +10522,7 @@
       </p:par>
     </p:tnLst>
     <p:bldLst>
-      <p:bldP build="p" bldLvl="1" animBg="1" rev="0" advAuto="0" spid="302" grpId="1"/>
+      <p:bldP build="whole" bldLvl="1" animBg="1" rev="0" advAuto="0" spid="302" grpId="1"/>
     </p:bldLst>
   </p:timing>
 </p:sld>
@@ -11670,195 +10951,7 @@
                                       <p:cBhvr>
                                         <p:cTn id="6" fill="hold"/>
                                         <p:tgtEl>
-                                          <p:spTgt spid="307">
-                                            <p:bg/>
-                                          </p:spTgt>
-                                        </p:tgtEl>
-                                        <p:attrNameLst>
-                                          <p:attrName>style.visibility</p:attrName>
-                                        </p:attrNameLst>
-                                      </p:cBhvr>
-                                      <p:to>
-                                        <p:strVal val="visible"/>
-                                      </p:to>
-                                    </p:set>
-                                  </p:childTnLst>
-                                </p:cTn>
-                              </p:par>
-                              <p:par>
-                                <p:cTn id="7" presetClass="entr" nodeType="withEffect" presetSubtype="0" presetID="1" grpId="1" fill="hold">
-                                  <p:stCondLst>
-                                    <p:cond delay="0"/>
-                                  </p:stCondLst>
-                                  <p:iterate type="el" backwards="0">
-                                    <p:tmAbs val="0"/>
-                                  </p:iterate>
-                                  <p:childTnLst>
-                                    <p:set>
-                                      <p:cBhvr>
-                                        <p:cTn id="8" fill="hold"/>
-                                        <p:tgtEl>
-                                          <p:spTgt spid="307">
-                                            <p:txEl>
-                                              <p:pRg st="0" end="0"/>
-                                            </p:txEl>
-                                          </p:spTgt>
-                                        </p:tgtEl>
-                                        <p:attrNameLst>
-                                          <p:attrName>style.visibility</p:attrName>
-                                        </p:attrNameLst>
-                                      </p:cBhvr>
-                                      <p:to>
-                                        <p:strVal val="visible"/>
-                                      </p:to>
-                                    </p:set>
-                                  </p:childTnLst>
-                                </p:cTn>
-                              </p:par>
-                            </p:childTnLst>
-                          </p:cTn>
-                        </p:par>
-                      </p:childTnLst>
-                    </p:cTn>
-                  </p:par>
-                  <p:par>
-                    <p:cTn id="9" fill="hold">
-                      <p:stCondLst>
-                        <p:cond delay="indefinite"/>
-                      </p:stCondLst>
-                      <p:childTnLst>
-                        <p:par>
-                          <p:cTn id="10" fill="hold">
-                            <p:stCondLst>
-                              <p:cond delay="0"/>
-                            </p:stCondLst>
-                            <p:childTnLst>
-                              <p:par>
-                                <p:cTn id="11" presetClass="entr" nodeType="clickEffect" presetSubtype="0" presetID="1" grpId="1" fill="hold">
-                                  <p:stCondLst>
-                                    <p:cond delay="0"/>
-                                  </p:stCondLst>
-                                  <p:iterate type="el" backwards="0">
-                                    <p:tmAbs val="0"/>
-                                  </p:iterate>
-                                  <p:childTnLst>
-                                    <p:set>
-                                      <p:cBhvr>
-                                        <p:cTn id="12" fill="hold"/>
-                                        <p:tgtEl>
-                                          <p:spTgt spid="307">
-                                            <p:txEl>
-                                              <p:pRg st="1" end="1"/>
-                                            </p:txEl>
-                                          </p:spTgt>
-                                        </p:tgtEl>
-                                        <p:attrNameLst>
-                                          <p:attrName>style.visibility</p:attrName>
-                                        </p:attrNameLst>
-                                      </p:cBhvr>
-                                      <p:to>
-                                        <p:strVal val="visible"/>
-                                      </p:to>
-                                    </p:set>
-                                  </p:childTnLst>
-                                </p:cTn>
-                              </p:par>
-                            </p:childTnLst>
-                          </p:cTn>
-                        </p:par>
-                      </p:childTnLst>
-                    </p:cTn>
-                  </p:par>
-                  <p:par>
-                    <p:cTn id="13" fill="hold">
-                      <p:stCondLst>
-                        <p:cond delay="indefinite"/>
-                      </p:stCondLst>
-                      <p:childTnLst>
-                        <p:par>
-                          <p:cTn id="14" fill="hold">
-                            <p:stCondLst>
-                              <p:cond delay="0"/>
-                            </p:stCondLst>
-                            <p:childTnLst>
-                              <p:par>
-                                <p:cTn id="15" presetClass="entr" nodeType="clickEffect" presetSubtype="0" presetID="1" grpId="1" fill="hold">
-                                  <p:stCondLst>
-                                    <p:cond delay="0"/>
-                                  </p:stCondLst>
-                                  <p:iterate type="el" backwards="0">
-                                    <p:tmAbs val="0"/>
-                                  </p:iterate>
-                                  <p:childTnLst>
-                                    <p:set>
-                                      <p:cBhvr>
-                                        <p:cTn id="16" fill="hold"/>
-                                        <p:tgtEl>
-                                          <p:spTgt spid="307">
-                                            <p:txEl>
-                                              <p:pRg st="2" end="2"/>
-                                            </p:txEl>
-                                          </p:spTgt>
-                                        </p:tgtEl>
-                                        <p:attrNameLst>
-                                          <p:attrName>style.visibility</p:attrName>
-                                        </p:attrNameLst>
-                                      </p:cBhvr>
-                                      <p:to>
-                                        <p:strVal val="visible"/>
-                                      </p:to>
-                                    </p:set>
-                                  </p:childTnLst>
-                                </p:cTn>
-                              </p:par>
-                              <p:par>
-                                <p:cTn id="17" presetClass="entr" nodeType="withEffect" presetSubtype="0" presetID="1" grpId="1" fill="hold">
-                                  <p:stCondLst>
-                                    <p:cond delay="0"/>
-                                  </p:stCondLst>
-                                  <p:iterate type="el" backwards="0">
-                                    <p:tmAbs val="0"/>
-                                  </p:iterate>
-                                  <p:childTnLst>
-                                    <p:set>
-                                      <p:cBhvr>
-                                        <p:cTn id="18" fill="hold"/>
-                                        <p:tgtEl>
-                                          <p:spTgt spid="307">
-                                            <p:txEl>
-                                              <p:pRg st="3" end="3"/>
-                                            </p:txEl>
-                                          </p:spTgt>
-                                        </p:tgtEl>
-                                        <p:attrNameLst>
-                                          <p:attrName>style.visibility</p:attrName>
-                                        </p:attrNameLst>
-                                      </p:cBhvr>
-                                      <p:to>
-                                        <p:strVal val="visible"/>
-                                      </p:to>
-                                    </p:set>
-                                  </p:childTnLst>
-                                </p:cTn>
-                              </p:par>
-                              <p:par>
-                                <p:cTn id="19" presetClass="entr" nodeType="withEffect" presetSubtype="0" presetID="1" grpId="1" fill="hold">
-                                  <p:stCondLst>
-                                    <p:cond delay="0"/>
-                                  </p:stCondLst>
-                                  <p:iterate type="el" backwards="0">
-                                    <p:tmAbs val="0"/>
-                                  </p:iterate>
-                                  <p:childTnLst>
-                                    <p:set>
-                                      <p:cBhvr>
-                                        <p:cTn id="20" fill="hold"/>
-                                        <p:tgtEl>
-                                          <p:spTgt spid="307">
-                                            <p:txEl>
-                                              <p:pRg st="4" end="4"/>
-                                            </p:txEl>
-                                          </p:spTgt>
+                                          <p:spTgt spid="307"/>
                                         </p:tgtEl>
                                         <p:attrNameLst>
                                           <p:attrName>style.visibility</p:attrName>
@@ -11899,7 +10992,7 @@
       </p:par>
     </p:tnLst>
     <p:bldLst>
-      <p:bldP build="p" bldLvl="1" animBg="1" rev="0" advAuto="0" spid="307" grpId="1"/>
+      <p:bldP build="whole" bldLvl="1" animBg="1" rev="0" advAuto="0" spid="307" grpId="1"/>
     </p:bldLst>
   </p:timing>
 </p:sld>
@@ -12338,204 +11431,7 @@
                                       <p:cBhvr>
                                         <p:cTn id="6" fill="hold"/>
                                         <p:tgtEl>
-                                          <p:spTgt spid="317">
-                                            <p:bg/>
-                                          </p:spTgt>
-                                        </p:tgtEl>
-                                        <p:attrNameLst>
-                                          <p:attrName>style.visibility</p:attrName>
-                                        </p:attrNameLst>
-                                      </p:cBhvr>
-                                      <p:to>
-                                        <p:strVal val="visible"/>
-                                      </p:to>
-                                    </p:set>
-                                  </p:childTnLst>
-                                </p:cTn>
-                              </p:par>
-                              <p:par>
-                                <p:cTn id="7" presetClass="entr" nodeType="withEffect" presetSubtype="0" presetID="1" grpId="1" fill="hold">
-                                  <p:stCondLst>
-                                    <p:cond delay="0"/>
-                                  </p:stCondLst>
-                                  <p:iterate type="el" backwards="0">
-                                    <p:tmAbs val="0"/>
-                                  </p:iterate>
-                                  <p:childTnLst>
-                                    <p:set>
-                                      <p:cBhvr>
-                                        <p:cTn id="8" fill="hold"/>
-                                        <p:tgtEl>
-                                          <p:spTgt spid="317">
-                                            <p:txEl>
-                                              <p:pRg st="0" end="0"/>
-                                            </p:txEl>
-                                          </p:spTgt>
-                                        </p:tgtEl>
-                                        <p:attrNameLst>
-                                          <p:attrName>style.visibility</p:attrName>
-                                        </p:attrNameLst>
-                                      </p:cBhvr>
-                                      <p:to>
-                                        <p:strVal val="visible"/>
-                                      </p:to>
-                                    </p:set>
-                                  </p:childTnLst>
-                                </p:cTn>
-                              </p:par>
-                            </p:childTnLst>
-                          </p:cTn>
-                        </p:par>
-                        <p:par>
-                          <p:cTn id="9" fill="hold">
-                            <p:stCondLst>
-                              <p:cond delay="0"/>
-                            </p:stCondLst>
-                            <p:childTnLst>
-                              <p:par>
-                                <p:cTn id="10" presetClass="entr" nodeType="afterEffect" presetSubtype="0" presetID="1" grpId="1" fill="hold">
-                                  <p:stCondLst>
-                                    <p:cond delay="0"/>
-                                  </p:stCondLst>
-                                  <p:iterate type="el" backwards="0">
-                                    <p:tmAbs val="0"/>
-                                  </p:iterate>
-                                  <p:childTnLst>
-                                    <p:set>
-                                      <p:cBhvr>
-                                        <p:cTn id="11" fill="hold"/>
-                                        <p:tgtEl>
-                                          <p:spTgt spid="317">
-                                            <p:txEl>
-                                              <p:pRg st="1" end="1"/>
-                                            </p:txEl>
-                                          </p:spTgt>
-                                        </p:tgtEl>
-                                        <p:attrNameLst>
-                                          <p:attrName>style.visibility</p:attrName>
-                                        </p:attrNameLst>
-                                      </p:cBhvr>
-                                      <p:to>
-                                        <p:strVal val="visible"/>
-                                      </p:to>
-                                    </p:set>
-                                  </p:childTnLst>
-                                </p:cTn>
-                              </p:par>
-                            </p:childTnLst>
-                          </p:cTn>
-                        </p:par>
-                        <p:par>
-                          <p:cTn id="12" fill="hold">
-                            <p:stCondLst>
-                              <p:cond delay="0"/>
-                            </p:stCondLst>
-                            <p:childTnLst>
-                              <p:par>
-                                <p:cTn id="13" presetClass="entr" nodeType="afterEffect" presetSubtype="0" presetID="1" grpId="1" fill="hold">
-                                  <p:stCondLst>
-                                    <p:cond delay="0"/>
-                                  </p:stCondLst>
-                                  <p:iterate type="el" backwards="0">
-                                    <p:tmAbs val="0"/>
-                                  </p:iterate>
-                                  <p:childTnLst>
-                                    <p:set>
-                                      <p:cBhvr>
-                                        <p:cTn id="14" fill="hold"/>
-                                        <p:tgtEl>
-                                          <p:spTgt spid="317">
-                                            <p:txEl>
-                                              <p:pRg st="2" end="2"/>
-                                            </p:txEl>
-                                          </p:spTgt>
-                                        </p:tgtEl>
-                                        <p:attrNameLst>
-                                          <p:attrName>style.visibility</p:attrName>
-                                        </p:attrNameLst>
-                                      </p:cBhvr>
-                                      <p:to>
-                                        <p:strVal val="visible"/>
-                                      </p:to>
-                                    </p:set>
-                                  </p:childTnLst>
-                                </p:cTn>
-                              </p:par>
-                            </p:childTnLst>
-                          </p:cTn>
-                        </p:par>
-                        <p:par>
-                          <p:cTn id="15" fill="hold">
-                            <p:stCondLst>
-                              <p:cond delay="0"/>
-                            </p:stCondLst>
-                            <p:childTnLst>
-                              <p:par>
-                                <p:cTn id="16" presetClass="entr" nodeType="afterEffect" presetSubtype="0" presetID="1" grpId="1" fill="hold">
-                                  <p:stCondLst>
-                                    <p:cond delay="0"/>
-                                  </p:stCondLst>
-                                  <p:iterate type="el" backwards="0">
-                                    <p:tmAbs val="0"/>
-                                  </p:iterate>
-                                  <p:childTnLst>
-                                    <p:set>
-                                      <p:cBhvr>
-                                        <p:cTn id="17" fill="hold"/>
-                                        <p:tgtEl>
-                                          <p:spTgt spid="317">
-                                            <p:txEl>
-                                              <p:pRg st="3" end="3"/>
-                                            </p:txEl>
-                                          </p:spTgt>
-                                        </p:tgtEl>
-                                        <p:attrNameLst>
-                                          <p:attrName>style.visibility</p:attrName>
-                                        </p:attrNameLst>
-                                      </p:cBhvr>
-                                      <p:to>
-                                        <p:strVal val="visible"/>
-                                      </p:to>
-                                    </p:set>
-                                  </p:childTnLst>
-                                </p:cTn>
-                              </p:par>
-                            </p:childTnLst>
-                          </p:cTn>
-                        </p:par>
-                      </p:childTnLst>
-                    </p:cTn>
-                  </p:par>
-                  <p:par>
-                    <p:cTn id="18" fill="hold">
-                      <p:stCondLst>
-                        <p:cond delay="indefinite"/>
-                      </p:stCondLst>
-                      <p:childTnLst>
-                        <p:par>
-                          <p:cTn id="19" fill="hold">
-                            <p:stCondLst>
-                              <p:cond delay="0"/>
-                            </p:stCondLst>
-                            <p:childTnLst>
-                              <p:par>
-                                <p:cTn id="20" presetClass="entr" nodeType="clickEffect" presetSubtype="0" presetID="1" grpId="1" fill="hold">
-                                  <p:stCondLst>
-                                    <p:cond delay="0"/>
-                                  </p:stCondLst>
-                                  <p:iterate type="el" backwards="0">
-                                    <p:tmAbs val="0"/>
-                                  </p:iterate>
-                                  <p:childTnLst>
-                                    <p:set>
-                                      <p:cBhvr>
-                                        <p:cTn id="21" fill="hold"/>
-                                        <p:tgtEl>
-                                          <p:spTgt spid="317">
-                                            <p:txEl>
-                                              <p:pRg st="4" end="4"/>
-                                            </p:txEl>
-                                          </p:spTgt>
+                                          <p:spTgt spid="317"/>
                                         </p:tgtEl>
                                         <p:attrNameLst>
                                           <p:attrName>style.visibility</p:attrName>
@@ -12576,7 +11472,7 @@
       </p:par>
     </p:tnLst>
     <p:bldLst>
-      <p:bldP build="p" bldLvl="5" animBg="1" rev="0" advAuto="0" spid="317" grpId="1"/>
+      <p:bldP build="whole" bldLvl="1" animBg="1" rev="0" advAuto="0" spid="317" grpId="1"/>
     </p:bldLst>
   </p:timing>
 </p:sld>
@@ -13711,8 +12607,8 @@
     <p:bldLst>
       <p:bldP build="whole" bldLvl="1" animBg="1" rev="0" advAuto="0" spid="329" grpId="2"/>
       <p:bldP build="whole" bldLvl="1" animBg="1" rev="0" advAuto="0" spid="331" grpId="4"/>
+      <p:bldP build="whole" bldLvl="1" animBg="1" rev="0" advAuto="0" spid="330" grpId="3"/>
       <p:bldP build="whole" bldLvl="1" animBg="1" rev="0" advAuto="0" spid="328" grpId="1"/>
-      <p:bldP build="whole" bldLvl="1" animBg="1" rev="0" advAuto="0" spid="330" grpId="3"/>
     </p:bldLst>
   </p:timing>
 </p:sld>
@@ -15264,19 +14160,7 @@
             <a:pPr marL="0" indent="0">
               <a:buSzTx/>
               <a:buNone/>
-              <a:defRPr b="1">
-                <a:solidFill>
-                  <a:srgbClr val="027E17"/>
-                </a:solidFill>
-                <a:latin typeface="Consolas"/>
-                <a:ea typeface="Consolas"/>
-                <a:cs typeface="Consolas"/>
-                <a:sym typeface="Consolas"/>
-              </a:defRPr>
-            </a:pPr>
-            <a:r>
-              <a:t>     </a:t>
-            </a:r>
+            </a:pPr>
           </a:p>
           <a:p>
             <a:pPr marL="0" indent="0">
@@ -15417,7 +14301,126 @@
                                       <p:cBhvr>
                                         <p:cTn id="6" fill="hold"/>
                                         <p:tgtEl>
-                                          <p:spTgt spid="364"/>
+                                          <p:spTgt spid="364">
+                                            <p:bg/>
+                                          </p:spTgt>
+                                        </p:tgtEl>
+                                        <p:attrNameLst>
+                                          <p:attrName>style.visibility</p:attrName>
+                                        </p:attrNameLst>
+                                      </p:cBhvr>
+                                      <p:to>
+                                        <p:strVal val="visible"/>
+                                      </p:to>
+                                    </p:set>
+                                  </p:childTnLst>
+                                </p:cTn>
+                              </p:par>
+                              <p:par>
+                                <p:cTn id="7" presetClass="entr" nodeType="withEffect" presetSubtype="0" presetID="1" grpId="1" fill="hold">
+                                  <p:stCondLst>
+                                    <p:cond delay="0"/>
+                                  </p:stCondLst>
+                                  <p:iterate type="el" backwards="0">
+                                    <p:tmAbs val="0"/>
+                                  </p:iterate>
+                                  <p:childTnLst>
+                                    <p:set>
+                                      <p:cBhvr>
+                                        <p:cTn id="8" fill="hold"/>
+                                        <p:tgtEl>
+                                          <p:spTgt spid="364">
+                                            <p:txEl>
+                                              <p:pRg st="0" end="0"/>
+                                            </p:txEl>
+                                          </p:spTgt>
+                                        </p:tgtEl>
+                                        <p:attrNameLst>
+                                          <p:attrName>style.visibility</p:attrName>
+                                        </p:attrNameLst>
+                                      </p:cBhvr>
+                                      <p:to>
+                                        <p:strVal val="visible"/>
+                                      </p:to>
+                                    </p:set>
+                                  </p:childTnLst>
+                                </p:cTn>
+                              </p:par>
+                            </p:childTnLst>
+                          </p:cTn>
+                        </p:par>
+                        <p:par>
+                          <p:cTn id="9" fill="hold">
+                            <p:stCondLst>
+                              <p:cond delay="0"/>
+                            </p:stCondLst>
+                            <p:childTnLst>
+                              <p:par>
+                                <p:cTn id="10" presetClass="entr" nodeType="afterEffect" presetSubtype="0" presetID="1" grpId="1" fill="hold">
+                                  <p:stCondLst>
+                                    <p:cond delay="0"/>
+                                  </p:stCondLst>
+                                  <p:iterate type="el" backwards="0">
+                                    <p:tmAbs val="0"/>
+                                  </p:iterate>
+                                  <p:childTnLst>
+                                    <p:set>
+                                      <p:cBhvr>
+                                        <p:cTn id="11" fill="hold"/>
+                                        <p:tgtEl>
+                                          <p:spTgt spid="364">
+                                            <p:txEl>
+                                              <p:pRg st="1" end="1"/>
+                                            </p:txEl>
+                                          </p:spTgt>
+                                        </p:tgtEl>
+                                        <p:attrNameLst>
+                                          <p:attrName>style.visibility</p:attrName>
+                                        </p:attrNameLst>
+                                      </p:cBhvr>
+                                      <p:to>
+                                        <p:strVal val="visible"/>
+                                      </p:to>
+                                    </p:set>
+                                  </p:childTnLst>
+                                </p:cTn>
+                              </p:par>
+                            </p:childTnLst>
+                          </p:cTn>
+                        </p:par>
+                      </p:childTnLst>
+                    </p:cTn>
+                  </p:par>
+                  <p:par>
+                    <p:cTn id="12" fill="hold">
+                      <p:stCondLst>
+                        <p:cond delay="indefinite"/>
+                      </p:stCondLst>
+                      <p:childTnLst>
+                        <p:par>
+                          <p:cTn id="13" fill="hold">
+                            <p:stCondLst>
+                              <p:cond delay="0"/>
+                            </p:stCondLst>
+                            <p:childTnLst>
+                              <p:par>
+                                <p:cTn id="14" presetClass="entr" nodeType="clickEffect" presetSubtype="0" presetID="1" grpId="1" fill="hold">
+                                  <p:stCondLst>
+                                    <p:cond delay="0"/>
+                                  </p:stCondLst>
+                                  <p:iterate type="el" backwards="0">
+                                    <p:tmAbs val="0"/>
+                                  </p:iterate>
+                                  <p:childTnLst>
+                                    <p:set>
+                                      <p:cBhvr>
+                                        <p:cTn id="15" fill="hold"/>
+                                        <p:tgtEl>
+                                          <p:spTgt spid="364">
+                                            <p:txEl>
+                                              <p:pRg st="2" end="2"/>
+                                            </p:txEl>
+                                          </p:spTgt>
                                         </p:tgtEl>
                                         <p:attrNameLst>
                                           <p:attrName>style.visibility</p:attrName>
@@ -15458,7 +14461,7 @@
       </p:par>
     </p:tnLst>
     <p:bldLst>
-      <p:bldP build="whole" bldLvl="1" animBg="1" rev="0" advAuto="0" spid="364" grpId="1"/>
+      <p:bldP build="p" bldLvl="5" animBg="1" rev="0" advAuto="0" spid="364" grpId="1"/>
     </p:bldLst>
   </p:timing>
 </p:sld>

</xml_diff>